<commit_message>
re #1059 updating rankin-sandbox to head of trunk
</commit_message>
<xml_diff>
--- a/branches/rankin-sandbox/doc/tutorials/MotorizedTransducerTransformsComputation.pptx
+++ b/branches/rankin-sandbox/doc/tutorials/MotorizedTransducerTransformsComputation.pptx
@@ -247,7 +247,7 @@
           <a:p>
             <a:fld id="{9286E650-C714-4422-84B3-52D981710F55}" type="datetimeFigureOut">
               <a:rPr lang="en-CA" smtClean="0"/>
-              <a:t>2014-06-10</a:t>
+              <a:t>2015-07-17</a:t>
             </a:fld>
             <a:endParaRPr lang="en-CA"/>
           </a:p>
@@ -417,7 +417,7 @@
           <a:p>
             <a:fld id="{9286E650-C714-4422-84B3-52D981710F55}" type="datetimeFigureOut">
               <a:rPr lang="en-CA" smtClean="0"/>
-              <a:t>2014-06-10</a:t>
+              <a:t>2015-07-17</a:t>
             </a:fld>
             <a:endParaRPr lang="en-CA"/>
           </a:p>
@@ -597,7 +597,7 @@
           <a:p>
             <a:fld id="{9286E650-C714-4422-84B3-52D981710F55}" type="datetimeFigureOut">
               <a:rPr lang="en-CA" smtClean="0"/>
-              <a:t>2014-06-10</a:t>
+              <a:t>2015-07-17</a:t>
             </a:fld>
             <a:endParaRPr lang="en-CA"/>
           </a:p>
@@ -767,7 +767,7 @@
           <a:p>
             <a:fld id="{9286E650-C714-4422-84B3-52D981710F55}" type="datetimeFigureOut">
               <a:rPr lang="en-CA" smtClean="0"/>
-              <a:t>2014-06-10</a:t>
+              <a:t>2015-07-17</a:t>
             </a:fld>
             <a:endParaRPr lang="en-CA"/>
           </a:p>
@@ -1013,7 +1013,7 @@
           <a:p>
             <a:fld id="{9286E650-C714-4422-84B3-52D981710F55}" type="datetimeFigureOut">
               <a:rPr lang="en-CA" smtClean="0"/>
-              <a:t>2014-06-10</a:t>
+              <a:t>2015-07-17</a:t>
             </a:fld>
             <a:endParaRPr lang="en-CA"/>
           </a:p>
@@ -1245,7 +1245,7 @@
           <a:p>
             <a:fld id="{9286E650-C714-4422-84B3-52D981710F55}" type="datetimeFigureOut">
               <a:rPr lang="en-CA" smtClean="0"/>
-              <a:t>2014-06-10</a:t>
+              <a:t>2015-07-17</a:t>
             </a:fld>
             <a:endParaRPr lang="en-CA"/>
           </a:p>
@@ -1612,7 +1612,7 @@
           <a:p>
             <a:fld id="{9286E650-C714-4422-84B3-52D981710F55}" type="datetimeFigureOut">
               <a:rPr lang="en-CA" smtClean="0"/>
-              <a:t>2014-06-10</a:t>
+              <a:t>2015-07-17</a:t>
             </a:fld>
             <a:endParaRPr lang="en-CA"/>
           </a:p>
@@ -1730,7 +1730,7 @@
           <a:p>
             <a:fld id="{9286E650-C714-4422-84B3-52D981710F55}" type="datetimeFigureOut">
               <a:rPr lang="en-CA" smtClean="0"/>
-              <a:t>2014-06-10</a:t>
+              <a:t>2015-07-17</a:t>
             </a:fld>
             <a:endParaRPr lang="en-CA"/>
           </a:p>
@@ -1825,7 +1825,7 @@
           <a:p>
             <a:fld id="{9286E650-C714-4422-84B3-52D981710F55}" type="datetimeFigureOut">
               <a:rPr lang="en-CA" smtClean="0"/>
-              <a:t>2014-06-10</a:t>
+              <a:t>2015-07-17</a:t>
             </a:fld>
             <a:endParaRPr lang="en-CA"/>
           </a:p>
@@ -2102,7 +2102,7 @@
           <a:p>
             <a:fld id="{9286E650-C714-4422-84B3-52D981710F55}" type="datetimeFigureOut">
               <a:rPr lang="en-CA" smtClean="0"/>
-              <a:t>2014-06-10</a:t>
+              <a:t>2015-07-17</a:t>
             </a:fld>
             <a:endParaRPr lang="en-CA"/>
           </a:p>
@@ -2355,7 +2355,7 @@
           <a:p>
             <a:fld id="{9286E650-C714-4422-84B3-52D981710F55}" type="datetimeFigureOut">
               <a:rPr lang="en-CA" smtClean="0"/>
-              <a:t>2014-06-10</a:t>
+              <a:t>2015-07-17</a:t>
             </a:fld>
             <a:endParaRPr lang="en-CA"/>
           </a:p>
@@ -2568,7 +2568,7 @@
           <a:p>
             <a:fld id="{9286E650-C714-4422-84B3-52D981710F55}" type="datetimeFigureOut">
               <a:rPr lang="en-CA" smtClean="0"/>
-              <a:t>2014-06-10</a:t>
+              <a:t>2015-07-17</a:t>
             </a:fld>
             <a:endParaRPr lang="en-CA"/>
           </a:p>
@@ -2994,10 +2994,14 @@
             </a:r>
             <a:r>
               <a:rPr lang="en-CA" dirty="0" smtClean="0"/>
-              <a:t> motorized transducer (4DC7-3/40) </a:t>
-            </a:r>
-            <a:r>
-              <a:rPr lang="en-CA" smtClean="0"/>
+              <a:t> motorized </a:t>
+            </a:r>
+            <a:r>
+              <a:rPr lang="en-CA" dirty="0" smtClean="0"/>
+              <a:t>transducer </a:t>
+            </a:r>
+            <a:r>
+              <a:rPr lang="en-CA" dirty="0" smtClean="0"/>
               <a:t>transforms computation</a:t>
             </a:r>
             <a:endParaRPr lang="en-CA" dirty="0"/>
@@ -3043,6 +3047,54 @@
               </a14:hiddenFill>
             </a:ext>
           </a:extLst>
+        </p:spPr>
+      </p:pic>
+      <p:pic>
+        <p:nvPicPr>
+          <p:cNvPr id="3" name="Picture 2"/>
+          <p:cNvPicPr>
+            <a:picLocks noChangeAspect="1"/>
+          </p:cNvPicPr>
+          <p:nvPr/>
+        </p:nvPicPr>
+        <p:blipFill>
+          <a:blip r:embed="rId3"/>
+          <a:stretch>
+            <a:fillRect/>
+          </a:stretch>
+        </p:blipFill>
+        <p:spPr>
+          <a:xfrm>
+            <a:off x="3287260" y="2764971"/>
+            <a:ext cx="1865164" cy="2271486"/>
+          </a:xfrm>
+          <a:prstGeom prst="rect">
+            <a:avLst/>
+          </a:prstGeom>
+        </p:spPr>
+      </p:pic>
+      <p:pic>
+        <p:nvPicPr>
+          <p:cNvPr id="4" name="Picture 3"/>
+          <p:cNvPicPr>
+            <a:picLocks noChangeAspect="1"/>
+          </p:cNvPicPr>
+          <p:nvPr/>
+        </p:nvPicPr>
+        <p:blipFill>
+          <a:blip r:embed="rId4"/>
+          <a:stretch>
+            <a:fillRect/>
+          </a:stretch>
+        </p:blipFill>
+        <p:spPr>
+          <a:xfrm>
+            <a:off x="7278892" y="2420483"/>
+            <a:ext cx="1621766" cy="2960461"/>
+          </a:xfrm>
+          <a:prstGeom prst="rect">
+            <a:avLst/>
+          </a:prstGeom>
         </p:spPr>
       </p:pic>
     </p:spTree>

</xml_diff>